<commit_message>
Powerpoint writer: add tests for underline.
</commit_message>
<xml_diff>
--- a/test/pptx/inline_formatting.pptx
+++ b/test/pptx/inline_formatting.pptx
@@ -3177,6 +3177,35 @@
             <a:r>
               <a:rPr cap="small"/>
               <a:t>small caps</a:t>
+            </a:r>
+            <a:r>
+              <a:rPr/>
+              <a:t>.</a:t>
+            </a:r>
+          </a:p>
+          <a:p>
+            <a:pPr lvl="0" marL="0" indent="0">
+              <a:buNone/>
+            </a:pPr>
+            <a:r>
+              <a:rPr/>
+              <a:t>Here is </a:t>
+            </a:r>
+            <a:r>
+              <a:rPr u="sng"/>
+              <a:t>some </a:t>
+            </a:r>
+            <a:r>
+              <a:rPr i="1" u="sng"/>
+              <a:t>underlined</a:t>
+            </a:r>
+            <a:r>
+              <a:rPr u="sng"/>
+              <a:t> </a:t>
+            </a:r>
+            <a:r>
+              <a:rPr b="1" u="sng"/>
+              <a:t>text</a:t>
             </a:r>
             <a:r>
               <a:rPr/>

</xml_diff>

<commit_message>
Handle native Underline in Powerpoint writer.
(Instead of old Span with underline class.
Spans with `underline` will no longer be rendered
as underlined text.)
</commit_message>
<xml_diff>
--- a/test/pptx/inline_formatting.pptx
+++ b/test/pptx/inline_formatting.pptx
@@ -3189,22 +3189,18 @@
             </a:pPr>
             <a:r>
               <a:rPr/>
-              <a:t>Here is </a:t>
-            </a:r>
-            <a:r>
-              <a:rPr u="sng"/>
-              <a:t>some </a:t>
-            </a:r>
-            <a:r>
-              <a:rPr i="1" u="sng"/>
+              <a:t>Here is some </a:t>
+            </a:r>
+            <a:r>
+              <a:rPr i="1"/>
               <a:t>underlined</a:t>
             </a:r>
             <a:r>
-              <a:rPr u="sng"/>
+              <a:rPr/>
               <a:t> </a:t>
             </a:r>
             <a:r>
-              <a:rPr b="1" u="sng"/>
+              <a:rPr b="1"/>
               <a:t>text</a:t>
             </a:r>
             <a:r>

</xml_diff>